<commit_message>
update tools in pres
</commit_message>
<xml_diff>
--- a/CyberInsightsPres.pptx
+++ b/CyberInsightsPres.pptx
@@ -16974,7 +16974,15 @@
             </a:r>
             <a:r>
               <a:rPr lang="en-US" sz="1400" dirty="0"/>
-              <a:t> Notebook, Pandas, Seaborn, and Matplotlib</a:t>
+              <a:t> Notebook, Pandas, Seaborn, </a:t>
+            </a:r>
+            <a:r>
+              <a:rPr lang="en-US" sz="1400" dirty="0" err="1"/>
+              <a:t>Plotly</a:t>
+            </a:r>
+            <a:r>
+              <a:rPr lang="en-US" sz="1400" dirty="0"/>
+              <a:t> Express and Matplotlib</a:t>
             </a:r>
             <a:endParaRPr sz="1400" dirty="0"/>
           </a:p>

</xml_diff>